<commit_message>
Präsentation vorbereitet mit bfh vorlage
</commit_message>
<xml_diff>
--- a/Doc/Semantische Datenbanken.pptx
+++ b/Doc/Semantische Datenbanken.pptx
@@ -208,7 +208,7 @@
           <a:p>
             <a:fld id="{5DCD1904-FFA2-4596-A31F-BED1909E316D}" type="datetimeFigureOut">
               <a:rPr lang="de-CH" smtClean="0"/>
-              <a:t>19.12.2014</a:t>
+              <a:t>30.12.2014</a:t>
             </a:fld>
             <a:endParaRPr lang="de-CH"/>
           </a:p>
@@ -520,105 +520,7 @@
           <a:bodyPr/>
           <a:lstStyle/>
           <a:p>
-            <a:r>
-              <a:rPr lang="de-CH" sz="1200" b="0" i="0" u="none" strike="noStrike" kern="1200" baseline="0" dirty="0" smtClean="0">
-                <a:solidFill>
-                  <a:schemeClr val="tx1"/>
-                </a:solidFill>
-                <a:latin typeface="+mn-lt"/>
-                <a:ea typeface="+mn-ea"/>
-                <a:cs typeface="+mn-cs"/>
-              </a:rPr>
-              <a:t>Internet-Suchmaschinen sind heutzutage ein gängiges Mittel um an Wissen im Internet zu gelangen. Deren stetige</a:t>
-            </a:r>
-          </a:p>
-          <a:p>
-            <a:r>
-              <a:rPr lang="de-CH" sz="1200" b="0" i="0" u="none" strike="noStrike" kern="1200" baseline="0" dirty="0" smtClean="0">
-                <a:solidFill>
-                  <a:schemeClr val="tx1"/>
-                </a:solidFill>
-                <a:latin typeface="+mn-lt"/>
-                <a:ea typeface="+mn-ea"/>
-                <a:cs typeface="+mn-cs"/>
-              </a:rPr>
-              <a:t>Weiterentwicklung über das letzte Jahrzehnt macht sie zu einem mächtigen Instrument. Sie werden von vielen</a:t>
-            </a:r>
-          </a:p>
-          <a:p>
-            <a:r>
-              <a:rPr lang="de-CH" sz="1200" b="0" i="0" u="none" strike="noStrike" kern="1200" baseline="0" dirty="0" smtClean="0">
-                <a:solidFill>
-                  <a:schemeClr val="tx1"/>
-                </a:solidFill>
-                <a:latin typeface="+mn-lt"/>
-                <a:ea typeface="+mn-ea"/>
-                <a:cs typeface="+mn-cs"/>
-              </a:rPr>
-              <a:t>Personen zur täglichen Arbeit verwendet.</a:t>
-            </a:r>
-          </a:p>
-          <a:p>
-            <a:r>
-              <a:rPr lang="de-CH" sz="1200" b="0" i="0" u="none" strike="noStrike" kern="1200" baseline="0" dirty="0" smtClean="0">
-                <a:solidFill>
-                  <a:schemeClr val="tx1"/>
-                </a:solidFill>
-                <a:latin typeface="+mn-lt"/>
-                <a:ea typeface="+mn-ea"/>
-                <a:cs typeface="+mn-cs"/>
-              </a:rPr>
-              <a:t>Suchmaschinen sind heute meist so gehalten, dass in ein Suchfeld </a:t>
-            </a:r>
-            <a:r>
-              <a:rPr lang="de-CH" sz="1200" b="0" i="0" u="none" strike="noStrike" kern="1200" baseline="0" dirty="0" err="1" smtClean="0">
-                <a:solidFill>
-                  <a:schemeClr val="tx1"/>
-                </a:solidFill>
-                <a:latin typeface="+mn-lt"/>
-                <a:ea typeface="+mn-ea"/>
-                <a:cs typeface="+mn-cs"/>
-              </a:rPr>
-              <a:t>Begriichkeiten</a:t>
-            </a:r>
-            <a:r>
-              <a:rPr lang="de-CH" sz="1200" b="0" i="0" u="none" strike="noStrike" kern="1200" baseline="0" dirty="0" smtClean="0">
-                <a:solidFill>
-                  <a:schemeClr val="tx1"/>
-                </a:solidFill>
-                <a:latin typeface="+mn-lt"/>
-                <a:ea typeface="+mn-ea"/>
-                <a:cs typeface="+mn-cs"/>
-              </a:rPr>
-              <a:t> eingegeben werden. Suchmaschinen</a:t>
-            </a:r>
-          </a:p>
-          <a:p>
-            <a:r>
-              <a:rPr lang="de-CH" sz="1200" b="0" i="0" u="none" strike="noStrike" kern="1200" baseline="0" dirty="0" smtClean="0">
-                <a:solidFill>
-                  <a:schemeClr val="tx1"/>
-                </a:solidFill>
-                <a:latin typeface="+mn-lt"/>
-                <a:ea typeface="+mn-ea"/>
-                <a:cs typeface="+mn-cs"/>
-              </a:rPr>
-              <a:t>indexieren Inhalte mittels Stich- und Schlagworten. Deshalb muss der Suchende bereits eine mehr oder</a:t>
-            </a:r>
-          </a:p>
-          <a:p>
-            <a:r>
-              <a:rPr lang="de-CH" sz="1200" b="0" i="0" u="none" strike="noStrike" kern="1200" baseline="0" dirty="0" smtClean="0">
-                <a:solidFill>
-                  <a:schemeClr val="tx1"/>
-                </a:solidFill>
-                <a:latin typeface="+mn-lt"/>
-                <a:ea typeface="+mn-ea"/>
-                <a:cs typeface="+mn-cs"/>
-              </a:rPr>
-              <a:t>minder konkrete Vorstellung von den erwarteten Suchergebnissen haben.</a:t>
-            </a:r>
-            <a:endParaRPr lang="de-CH" dirty="0"/>
+            <a:endParaRPr lang="de-CH"/>
           </a:p>
         </p:txBody>
       </p:sp>
@@ -639,7 +541,7 @@
           <a:p>
             <a:fld id="{87AD8812-5900-498C-95A0-946A82B6DFB7}" type="slidenum">
               <a:rPr lang="de-CH" smtClean="0"/>
-              <a:t>3</a:t>
+              <a:t>1</a:t>
             </a:fld>
             <a:endParaRPr lang="de-CH"/>
           </a:p>
@@ -648,7 +550,7 @@
     </p:spTree>
     <p:extLst>
       <p:ext uri="{BB962C8B-B14F-4D97-AF65-F5344CB8AC3E}">
-        <p14:creationId xmlns:p14="http://schemas.microsoft.com/office/powerpoint/2010/main" val="2768061922"/>
+        <p14:creationId xmlns:p14="http://schemas.microsoft.com/office/powerpoint/2010/main" val="1242111881"/>
       </p:ext>
     </p:extLst>
   </p:cSld>
@@ -711,7 +613,7 @@
                 <a:ea typeface="+mn-ea"/>
                 <a:cs typeface="+mn-cs"/>
               </a:rPr>
-              <a:t>Der klassische Ansatz der Wissensabbildung, zum Beispiel in Form von UML, welchem die relationale Datenspeicherung</a:t>
+              <a:t>Internet-Suchmaschinen sind heutzutage ein gängiges Mittel um an Wissen im Internet zu gelangen. Deren stetige</a:t>
             </a:r>
           </a:p>
           <a:p>
@@ -724,7 +626,33 @@
                 <a:ea typeface="+mn-ea"/>
                 <a:cs typeface="+mn-cs"/>
               </a:rPr>
-              <a:t>zugrunde liegt, wird in der heutigen Informatik </a:t>
+              <a:t>Weiterentwicklung über das letzte Jahrzehnt macht sie zu einem mächtigen Instrument. Sie werden von vielen</a:t>
+            </a:r>
+          </a:p>
+          <a:p>
+            <a:r>
+              <a:rPr lang="de-CH" sz="1200" b="0" i="0" u="none" strike="noStrike" kern="1200" baseline="0" dirty="0" smtClean="0">
+                <a:solidFill>
+                  <a:schemeClr val="tx1"/>
+                </a:solidFill>
+                <a:latin typeface="+mn-lt"/>
+                <a:ea typeface="+mn-ea"/>
+                <a:cs typeface="+mn-cs"/>
+              </a:rPr>
+              <a:t>Personen zur täglichen Arbeit verwendet.</a:t>
+            </a:r>
+          </a:p>
+          <a:p>
+            <a:r>
+              <a:rPr lang="de-CH" sz="1200" b="0" i="0" u="none" strike="noStrike" kern="1200" baseline="0" dirty="0" smtClean="0">
+                <a:solidFill>
+                  <a:schemeClr val="tx1"/>
+                </a:solidFill>
+                <a:latin typeface="+mn-lt"/>
+                <a:ea typeface="+mn-ea"/>
+                <a:cs typeface="+mn-cs"/>
+              </a:rPr>
+              <a:t>Suchmaschinen sind heute meist so gehalten, dass in ein Suchfeld </a:t>
             </a:r>
             <a:r>
               <a:rPr lang="de-CH" sz="1200" b="0" i="0" u="none" strike="noStrike" kern="1200" baseline="0" dirty="0" err="1" smtClean="0">
@@ -735,7 +663,7 @@
                 <a:ea typeface="+mn-ea"/>
                 <a:cs typeface="+mn-cs"/>
               </a:rPr>
-              <a:t>weitläug</a:t>
+              <a:t>Begriichkeiten</a:t>
             </a:r>
             <a:r>
               <a:rPr lang="de-CH" sz="1200" b="0" i="0" u="none" strike="noStrike" kern="1200" baseline="0" dirty="0" smtClean="0">
@@ -746,27 +674,8 @@
                 <a:ea typeface="+mn-ea"/>
                 <a:cs typeface="+mn-cs"/>
               </a:rPr>
-              <a:t> eingesetzt und ist de facto Standard. </a:t>
-            </a:r>
-            <a:r>
-              <a:rPr lang="de-CH" sz="1200" b="0" i="0" u="none" strike="noStrike" kern="1200" baseline="0" dirty="0" err="1" smtClean="0">
-                <a:solidFill>
-                  <a:schemeClr val="tx1"/>
-                </a:solidFill>
-                <a:latin typeface="+mn-lt"/>
-                <a:ea typeface="+mn-ea"/>
-                <a:cs typeface="+mn-cs"/>
-              </a:rPr>
-              <a:t>Häug</a:t>
-            </a:r>
-            <a:endParaRPr lang="de-CH" sz="1200" b="0" i="0" u="none" strike="noStrike" kern="1200" baseline="0" dirty="0" smtClean="0">
-              <a:solidFill>
-                <a:schemeClr val="tx1"/>
-              </a:solidFill>
-              <a:latin typeface="+mn-lt"/>
-              <a:ea typeface="+mn-ea"/>
-              <a:cs typeface="+mn-cs"/>
-            </a:endParaRPr>
+              <a:t> eingegeben werden. Suchmaschinen</a:t>
+            </a:r>
           </a:p>
           <a:p>
             <a:r>
@@ -778,7 +687,7 @@
                 <a:ea typeface="+mn-ea"/>
                 <a:cs typeface="+mn-cs"/>
               </a:rPr>
-              <a:t>geschieht dies in enger Verbindung mit der objektorientierten Programmierung. Experten aus einer Fachrichtung</a:t>
+              <a:t>indexieren Inhalte mittels Stich- und Schlagworten. Deshalb muss der Suchende bereits eine mehr oder</a:t>
             </a:r>
           </a:p>
           <a:p>
@@ -791,59 +700,7 @@
                 <a:ea typeface="+mn-ea"/>
                 <a:cs typeface="+mn-cs"/>
               </a:rPr>
-              <a:t>sind fähig diese Daten zu interpretieren und daraus Schlüsse zu ziehen. Es ist aber nicht möglich automatisch</a:t>
-            </a:r>
-          </a:p>
-          <a:p>
-            <a:r>
-              <a:rPr lang="de-CH" sz="1200" b="0" i="0" u="none" strike="noStrike" kern="1200" baseline="0" dirty="0" smtClean="0">
-                <a:solidFill>
-                  <a:schemeClr val="tx1"/>
-                </a:solidFill>
-                <a:latin typeface="+mn-lt"/>
-                <a:ea typeface="+mn-ea"/>
-                <a:cs typeface="+mn-cs"/>
-              </a:rPr>
-              <a:t>Fragestellungen zu beantworten, welche über reine Relationsverknüpfungen hinausgehen. Mit dieser Technik sind</a:t>
-            </a:r>
-          </a:p>
-          <a:p>
-            <a:r>
-              <a:rPr lang="de-CH" sz="1200" b="0" i="0" u="none" strike="noStrike" kern="1200" baseline="0" dirty="0" smtClean="0">
-                <a:solidFill>
-                  <a:schemeClr val="tx1"/>
-                </a:solidFill>
-                <a:latin typeface="+mn-lt"/>
-                <a:ea typeface="+mn-ea"/>
-                <a:cs typeface="+mn-cs"/>
-              </a:rPr>
-              <a:t>Objekteigenschaften und -Verhalten also eher schwer abbildbar. Eine andere Art Wissen zu repräsentieren sind</a:t>
-            </a:r>
-          </a:p>
-          <a:p>
-            <a:r>
-              <a:rPr lang="de-CH" sz="1200" b="0" i="0" u="none" strike="noStrike" kern="1200" baseline="0" dirty="0" smtClean="0">
-                <a:solidFill>
-                  <a:schemeClr val="tx1"/>
-                </a:solidFill>
-                <a:latin typeface="+mn-lt"/>
-                <a:ea typeface="+mn-ea"/>
-                <a:cs typeface="+mn-cs"/>
-              </a:rPr>
-              <a:t>semantische Datenbanken. Diese ermöglichen das Abbilden des Objektverhaltens und können mithilfe von Schlussfolgerungen</a:t>
-            </a:r>
-          </a:p>
-          <a:p>
-            <a:r>
-              <a:rPr lang="de-CH" sz="1200" b="0" i="0" u="none" strike="noStrike" kern="1200" baseline="0" dirty="0" smtClean="0">
-                <a:solidFill>
-                  <a:schemeClr val="tx1"/>
-                </a:solidFill>
-                <a:latin typeface="+mn-lt"/>
-                <a:ea typeface="+mn-ea"/>
-                <a:cs typeface="+mn-cs"/>
-              </a:rPr>
-              <a:t>die Rolle des Experten einnehmen.</a:t>
+              <a:t>minder konkrete Vorstellung von den erwarteten Suchergebnissen haben.</a:t>
             </a:r>
             <a:endParaRPr lang="de-CH" dirty="0"/>
           </a:p>
@@ -866,7 +723,7 @@
           <a:p>
             <a:fld id="{87AD8812-5900-498C-95A0-946A82B6DFB7}" type="slidenum">
               <a:rPr lang="de-CH" smtClean="0"/>
-              <a:t>4</a:t>
+              <a:t>3</a:t>
             </a:fld>
             <a:endParaRPr lang="de-CH"/>
           </a:p>
@@ -875,7 +732,7 @@
     </p:spTree>
     <p:extLst>
       <p:ext uri="{BB962C8B-B14F-4D97-AF65-F5344CB8AC3E}">
-        <p14:creationId xmlns:p14="http://schemas.microsoft.com/office/powerpoint/2010/main" val="1711349915"/>
+        <p14:creationId xmlns:p14="http://schemas.microsoft.com/office/powerpoint/2010/main" val="2768061922"/>
       </p:ext>
     </p:extLst>
   </p:cSld>
@@ -938,7 +795,7 @@
                 <a:ea typeface="+mn-ea"/>
                 <a:cs typeface="+mn-cs"/>
               </a:rPr>
-              <a:t>In dieser Bachelorthesis soll eine solche semantische Datenbank aufgebaut und angewendet werden. Die Arbeit</a:t>
+              <a:t>Der klassische Ansatz der Wissensabbildung, zum Beispiel in Form von UML, welchem die relationale Datenspeicherung</a:t>
             </a:r>
           </a:p>
           <a:p>
@@ -951,10 +808,19 @@
                 <a:ea typeface="+mn-ea"/>
                 <a:cs typeface="+mn-cs"/>
               </a:rPr>
-              <a:t>wurde in zwei Teilen umgesetzt: Einem theoretischen und einem praktischen Teil. Der theoretische Teil zeigt</a:t>
-            </a:r>
-          </a:p>
-          <a:p>
+              <a:t>zugrunde liegt, wird in der heutigen Informatik </a:t>
+            </a:r>
+            <a:r>
+              <a:rPr lang="de-CH" sz="1200" b="0" i="0" u="none" strike="noStrike" kern="1200" baseline="0" dirty="0" err="1" smtClean="0">
+                <a:solidFill>
+                  <a:schemeClr val="tx1"/>
+                </a:solidFill>
+                <a:latin typeface="+mn-lt"/>
+                <a:ea typeface="+mn-ea"/>
+                <a:cs typeface="+mn-cs"/>
+              </a:rPr>
+              <a:t>weitläug</a:t>
+            </a:r>
             <a:r>
               <a:rPr lang="de-CH" sz="1200" b="0" i="0" u="none" strike="noStrike" kern="1200" baseline="0" dirty="0" smtClean="0">
                 <a:solidFill>
@@ -964,7 +830,7 @@
                 <a:ea typeface="+mn-ea"/>
                 <a:cs typeface="+mn-cs"/>
               </a:rPr>
-              <a:t>in Form eines Tutorials auf, wie ein </a:t>
+              <a:t> eingesetzt und ist de facto Standard. </a:t>
             </a:r>
             <a:r>
               <a:rPr lang="de-CH" sz="1200" b="0" i="0" u="none" strike="noStrike" kern="1200" baseline="0" dirty="0" err="1" smtClean="0">
@@ -975,8 +841,18 @@
                 <a:ea typeface="+mn-ea"/>
                 <a:cs typeface="+mn-cs"/>
               </a:rPr>
-              <a:t>knowledge</a:t>
-            </a:r>
+              <a:t>Häug</a:t>
+            </a:r>
+            <a:endParaRPr lang="de-CH" sz="1200" b="0" i="0" u="none" strike="noStrike" kern="1200" baseline="0" dirty="0" smtClean="0">
+              <a:solidFill>
+                <a:schemeClr val="tx1"/>
+              </a:solidFill>
+              <a:latin typeface="+mn-lt"/>
+              <a:ea typeface="+mn-ea"/>
+              <a:cs typeface="+mn-cs"/>
+            </a:endParaRPr>
+          </a:p>
+          <a:p>
             <a:r>
               <a:rPr lang="de-CH" sz="1200" b="0" i="0" u="none" strike="noStrike" kern="1200" baseline="0" dirty="0" smtClean="0">
                 <a:solidFill>
@@ -986,19 +862,10 @@
                 <a:ea typeface="+mn-ea"/>
                 <a:cs typeface="+mn-cs"/>
               </a:rPr>
-              <a:t> </a:t>
-            </a:r>
-            <a:r>
-              <a:rPr lang="de-CH" sz="1200" b="0" i="0" u="none" strike="noStrike" kern="1200" baseline="0" dirty="0" err="1" smtClean="0">
-                <a:solidFill>
-                  <a:schemeClr val="tx1"/>
-                </a:solidFill>
-                <a:latin typeface="+mn-lt"/>
-                <a:ea typeface="+mn-ea"/>
-                <a:cs typeface="+mn-cs"/>
-              </a:rPr>
-              <a:t>engineer</a:t>
-            </a:r>
+              <a:t>geschieht dies in enger Verbindung mit der objektorientierten Programmierung. Experten aus einer Fachrichtung</a:t>
+            </a:r>
+          </a:p>
+          <a:p>
             <a:r>
               <a:rPr lang="de-CH" sz="1200" b="0" i="0" u="none" strike="noStrike" kern="1200" baseline="0" dirty="0" smtClean="0">
                 <a:solidFill>
@@ -1008,21 +875,10 @@
                 <a:ea typeface="+mn-ea"/>
                 <a:cs typeface="+mn-cs"/>
               </a:rPr>
-              <a:t> bei der Wissensmodellierung vorgeht. Er nutzt dabei</a:t>
-            </a:r>
-          </a:p>
-          <a:p>
-            <a:r>
-              <a:rPr lang="de-CH" sz="1200" b="0" i="0" u="none" strike="noStrike" kern="1200" baseline="0" dirty="0" err="1" smtClean="0">
-                <a:solidFill>
-                  <a:schemeClr val="tx1"/>
-                </a:solidFill>
-                <a:latin typeface="+mn-lt"/>
-                <a:ea typeface="+mn-ea"/>
-                <a:cs typeface="+mn-cs"/>
-              </a:rPr>
-              <a:t>Ontologien</a:t>
-            </a:r>
+              <a:t>sind fähig diese Daten zu interpretieren und daraus Schlüsse zu ziehen. Es ist aber nicht möglich automatisch</a:t>
+            </a:r>
+          </a:p>
+          <a:p>
             <a:r>
               <a:rPr lang="de-CH" sz="1200" b="0" i="0" u="none" strike="noStrike" kern="1200" baseline="0" dirty="0" smtClean="0">
                 <a:solidFill>
@@ -1032,7 +888,7 @@
                 <a:ea typeface="+mn-ea"/>
                 <a:cs typeface="+mn-cs"/>
               </a:rPr>
-              <a:t> als Basis, um eine semantische Datenbank aufzubauen. Im praktischen Teil soll eine solche Ontologie</a:t>
+              <a:t>Fragestellungen zu beantworten, welche über reine Relationsverknüpfungen hinausgehen. Mit dieser Technik sind</a:t>
             </a:r>
           </a:p>
           <a:p>
@@ -1045,7 +901,33 @@
                 <a:ea typeface="+mn-ea"/>
                 <a:cs typeface="+mn-cs"/>
               </a:rPr>
-              <a:t>aufgebaut und per Benutzerschnittstelle zugänglich gemacht werden.</a:t>
+              <a:t>Objekteigenschaften und -Verhalten also eher schwer abbildbar. Eine andere Art Wissen zu repräsentieren sind</a:t>
+            </a:r>
+          </a:p>
+          <a:p>
+            <a:r>
+              <a:rPr lang="de-CH" sz="1200" b="0" i="0" u="none" strike="noStrike" kern="1200" baseline="0" dirty="0" smtClean="0">
+                <a:solidFill>
+                  <a:schemeClr val="tx1"/>
+                </a:solidFill>
+                <a:latin typeface="+mn-lt"/>
+                <a:ea typeface="+mn-ea"/>
+                <a:cs typeface="+mn-cs"/>
+              </a:rPr>
+              <a:t>semantische Datenbanken. Diese ermöglichen das Abbilden des Objektverhaltens und können mithilfe von Schlussfolgerungen</a:t>
+            </a:r>
+          </a:p>
+          <a:p>
+            <a:r>
+              <a:rPr lang="de-CH" sz="1200" b="0" i="0" u="none" strike="noStrike" kern="1200" baseline="0" dirty="0" smtClean="0">
+                <a:solidFill>
+                  <a:schemeClr val="tx1"/>
+                </a:solidFill>
+                <a:latin typeface="+mn-lt"/>
+                <a:ea typeface="+mn-ea"/>
+                <a:cs typeface="+mn-cs"/>
+              </a:rPr>
+              <a:t>die Rolle des Experten einnehmen.</a:t>
             </a:r>
             <a:endParaRPr lang="de-CH" dirty="0"/>
           </a:p>
@@ -1068,7 +950,7 @@
           <a:p>
             <a:fld id="{87AD8812-5900-498C-95A0-946A82B6DFB7}" type="slidenum">
               <a:rPr lang="de-CH" smtClean="0"/>
-              <a:t>5</a:t>
+              <a:t>4</a:t>
             </a:fld>
             <a:endParaRPr lang="de-CH"/>
           </a:p>
@@ -1077,7 +959,7 @@
     </p:spTree>
     <p:extLst>
       <p:ext uri="{BB962C8B-B14F-4D97-AF65-F5344CB8AC3E}">
-        <p14:creationId xmlns:p14="http://schemas.microsoft.com/office/powerpoint/2010/main" val="4245693295"/>
+        <p14:creationId xmlns:p14="http://schemas.microsoft.com/office/powerpoint/2010/main" val="1711349915"/>
       </p:ext>
     </p:extLst>
   </p:cSld>
@@ -1132,37 +1014,6 @@
           <a:lstStyle/>
           <a:p>
             <a:r>
-              <a:rPr lang="de-CH" dirty="0" smtClean="0"/>
-              <a:t>Problemdomäne ursprünglich Prolog</a:t>
-            </a:r>
-          </a:p>
-          <a:p>
-            <a:r>
-              <a:rPr lang="de-CH" dirty="0" smtClean="0"/>
-              <a:t>-&gt;</a:t>
-            </a:r>
-            <a:r>
-              <a:rPr lang="de-CH" baseline="0" dirty="0" smtClean="0"/>
-              <a:t> Für welche Art von Domänen sind </a:t>
-            </a:r>
-            <a:r>
-              <a:rPr lang="de-CH" baseline="0" dirty="0" err="1" smtClean="0"/>
-              <a:t>Ontologien</a:t>
-            </a:r>
-            <a:r>
-              <a:rPr lang="de-CH" baseline="0" dirty="0" smtClean="0"/>
-              <a:t> geeignet</a:t>
-            </a:r>
-            <a:endParaRPr lang="de-CH" dirty="0" smtClean="0"/>
-          </a:p>
-          <a:p>
-            <a:endParaRPr lang="de-CH" dirty="0" smtClean="0"/>
-          </a:p>
-          <a:p>
-            <a:endParaRPr lang="de-CH" dirty="0" smtClean="0"/>
-          </a:p>
-          <a:p>
-            <a:r>
               <a:rPr lang="de-CH" sz="1200" b="0" i="0" u="none" strike="noStrike" kern="1200" baseline="0" dirty="0" smtClean="0">
                 <a:solidFill>
                   <a:schemeClr val="tx1"/>
@@ -1171,10 +1022,34 @@
                 <a:ea typeface="+mn-ea"/>
                 <a:cs typeface="+mn-cs"/>
               </a:rPr>
-              <a:t>Im praktischen Teil der Arbeit wurde ein Expertensystem für Reisen aufgebaut: In der heutigen Zeit werden Ferien</a:t>
-            </a:r>
-          </a:p>
-          <a:p>
+              <a:t>In dieser Bachelorthesis soll eine solche semantische Datenbank aufgebaut und angewendet werden. Die Arbeit</a:t>
+            </a:r>
+          </a:p>
+          <a:p>
+            <a:r>
+              <a:rPr lang="de-CH" sz="1200" b="0" i="0" u="none" strike="noStrike" kern="1200" baseline="0" dirty="0" smtClean="0">
+                <a:solidFill>
+                  <a:schemeClr val="tx1"/>
+                </a:solidFill>
+                <a:latin typeface="+mn-lt"/>
+                <a:ea typeface="+mn-ea"/>
+                <a:cs typeface="+mn-cs"/>
+              </a:rPr>
+              <a:t>wurde in zwei Teilen umgesetzt: Einem theoretischen und einem praktischen Teil. Der theoretische Teil zeigt</a:t>
+            </a:r>
+          </a:p>
+          <a:p>
+            <a:r>
+              <a:rPr lang="de-CH" sz="1200" b="0" i="0" u="none" strike="noStrike" kern="1200" baseline="0" dirty="0" smtClean="0">
+                <a:solidFill>
+                  <a:schemeClr val="tx1"/>
+                </a:solidFill>
+                <a:latin typeface="+mn-lt"/>
+                <a:ea typeface="+mn-ea"/>
+                <a:cs typeface="+mn-cs"/>
+              </a:rPr>
+              <a:t>in Form eines Tutorials auf, wie ein </a:t>
+            </a:r>
             <a:r>
               <a:rPr lang="de-CH" sz="1200" b="0" i="0" u="none" strike="noStrike" kern="1200" baseline="0" dirty="0" err="1" smtClean="0">
                 <a:solidFill>
@@ -1184,7 +1059,7 @@
                 <a:ea typeface="+mn-ea"/>
                 <a:cs typeface="+mn-cs"/>
               </a:rPr>
-              <a:t>häug</a:t>
+              <a:t>knowledge</a:t>
             </a:r>
             <a:r>
               <a:rPr lang="de-CH" sz="1200" b="0" i="0" u="none" strike="noStrike" kern="1200" baseline="0" dirty="0" smtClean="0">
@@ -1195,7 +1070,7 @@
                 <a:ea typeface="+mn-ea"/>
                 <a:cs typeface="+mn-cs"/>
               </a:rPr>
-              <a:t> per Internet gebucht. Was aber, wenn der Urlaub nicht einfach zwei Wochen an einem Ort </a:t>
+              <a:t> </a:t>
             </a:r>
             <a:r>
               <a:rPr lang="de-CH" sz="1200" b="0" i="0" u="none" strike="noStrike" kern="1200" baseline="0" dirty="0" err="1" smtClean="0">
@@ -1206,18 +1081,8 @@
                 <a:ea typeface="+mn-ea"/>
                 <a:cs typeface="+mn-cs"/>
               </a:rPr>
-              <a:t>stattnden</a:t>
-            </a:r>
-            <a:endParaRPr lang="de-CH" sz="1200" b="0" i="0" u="none" strike="noStrike" kern="1200" baseline="0" dirty="0" smtClean="0">
-              <a:solidFill>
-                <a:schemeClr val="tx1"/>
-              </a:solidFill>
-              <a:latin typeface="+mn-lt"/>
-              <a:ea typeface="+mn-ea"/>
-              <a:cs typeface="+mn-cs"/>
-            </a:endParaRPr>
-          </a:p>
-          <a:p>
+              <a:t>engineer</a:t>
+            </a:r>
             <a:r>
               <a:rPr lang="de-CH" sz="1200" b="0" i="0" u="none" strike="noStrike" kern="1200" baseline="0" dirty="0" smtClean="0">
                 <a:solidFill>
@@ -1227,10 +1092,21 @@
                 <a:ea typeface="+mn-ea"/>
                 <a:cs typeface="+mn-cs"/>
               </a:rPr>
-              <a:t>soll? Was, wenn der Kunde reisen möchte? Oder sonstige spezielle Wünsche hat? Für solche Anforderungen muss</a:t>
-            </a:r>
-          </a:p>
-          <a:p>
+              <a:t> bei der Wissensmodellierung vorgeht. Er nutzt dabei</a:t>
+            </a:r>
+          </a:p>
+          <a:p>
+            <a:r>
+              <a:rPr lang="de-CH" sz="1200" b="0" i="0" u="none" strike="noStrike" kern="1200" baseline="0" dirty="0" err="1" smtClean="0">
+                <a:solidFill>
+                  <a:schemeClr val="tx1"/>
+                </a:solidFill>
+                <a:latin typeface="+mn-lt"/>
+                <a:ea typeface="+mn-ea"/>
+                <a:cs typeface="+mn-cs"/>
+              </a:rPr>
+              <a:t>Ontologien</a:t>
+            </a:r>
             <a:r>
               <a:rPr lang="de-CH" sz="1200" b="0" i="0" u="none" strike="noStrike" kern="1200" baseline="0" dirty="0" smtClean="0">
                 <a:solidFill>
@@ -1240,7 +1116,7 @@
                 <a:ea typeface="+mn-ea"/>
                 <a:cs typeface="+mn-cs"/>
               </a:rPr>
-              <a:t>er auch heute noch in ein Reisebüro um sich beraten zu lassen.</a:t>
+              <a:t> als Basis, um eine semantische Datenbank aufzubauen. Im praktischen Teil soll eine solche Ontologie</a:t>
             </a:r>
           </a:p>
           <a:p>
@@ -1253,155 +1129,8 @@
                 <a:ea typeface="+mn-ea"/>
                 <a:cs typeface="+mn-cs"/>
               </a:rPr>
-              <a:t>Bei der Automatisierung dieses Prozesses kommt die Ontologie ins Spiel, welche mithilfe von Eigenschaften,</a:t>
-            </a:r>
-          </a:p>
-          <a:p>
-            <a:r>
-              <a:rPr lang="de-CH" sz="1200" b="0" i="0" u="none" strike="noStrike" kern="1200" baseline="0" dirty="0" smtClean="0">
-                <a:solidFill>
-                  <a:schemeClr val="tx1"/>
-                </a:solidFill>
-                <a:latin typeface="+mn-lt"/>
-                <a:ea typeface="+mn-ea"/>
-                <a:cs typeface="+mn-cs"/>
-              </a:rPr>
-              <a:t>Kriterien und Regeln die Problemdomäne abbildet. Durch die Verwendung eines </a:t>
-            </a:r>
-            <a:r>
-              <a:rPr lang="de-CH" sz="1200" b="0" i="0" u="none" strike="noStrike" kern="1200" baseline="0" dirty="0" err="1" smtClean="0">
-                <a:solidFill>
-                  <a:schemeClr val="tx1"/>
-                </a:solidFill>
-                <a:latin typeface="+mn-lt"/>
-                <a:ea typeface="+mn-ea"/>
-                <a:cs typeface="+mn-cs"/>
-              </a:rPr>
-              <a:t>Reasoners</a:t>
-            </a:r>
-            <a:r>
-              <a:rPr lang="de-CH" sz="1200" b="0" i="0" u="none" strike="noStrike" kern="1200" baseline="0" dirty="0" smtClean="0">
-                <a:solidFill>
-                  <a:schemeClr val="tx1"/>
-                </a:solidFill>
-                <a:latin typeface="+mn-lt"/>
-                <a:ea typeface="+mn-ea"/>
-                <a:cs typeface="+mn-cs"/>
-              </a:rPr>
-              <a:t> können verschiedene</a:t>
-            </a:r>
-          </a:p>
-          <a:p>
-            <a:r>
-              <a:rPr lang="de-CH" sz="1200" b="0" i="0" u="none" strike="noStrike" kern="1200" baseline="0" dirty="0" smtClean="0">
-                <a:solidFill>
-                  <a:schemeClr val="tx1"/>
-                </a:solidFill>
-                <a:latin typeface="+mn-lt"/>
-                <a:ea typeface="+mn-ea"/>
-                <a:cs typeface="+mn-cs"/>
-              </a:rPr>
-              <a:t>Reisevorschläge gemacht werden.</a:t>
-            </a:r>
-          </a:p>
-          <a:p>
-            <a:r>
-              <a:rPr lang="de-CH" sz="1200" b="0" i="0" u="none" strike="noStrike" kern="1200" baseline="0" dirty="0" smtClean="0">
-                <a:solidFill>
-                  <a:schemeClr val="tx1"/>
-                </a:solidFill>
-                <a:latin typeface="+mn-lt"/>
-                <a:ea typeface="+mn-ea"/>
-                <a:cs typeface="+mn-cs"/>
-              </a:rPr>
-              <a:t>Um eine sehr individuelle Reiseplanung zu erreichen, musste zuerst eine Ontologie in Form von Klassen, Individuen,</a:t>
-            </a:r>
-          </a:p>
-          <a:p>
-            <a:r>
-              <a:rPr lang="de-CH" sz="1200" b="0" i="0" u="none" strike="noStrike" kern="1200" baseline="0" dirty="0" smtClean="0">
-                <a:solidFill>
-                  <a:schemeClr val="tx1"/>
-                </a:solidFill>
-                <a:latin typeface="+mn-lt"/>
-                <a:ea typeface="+mn-ea"/>
-                <a:cs typeface="+mn-cs"/>
-              </a:rPr>
-              <a:t>Relationen und Eigenschaften erstellt werden. Ohne klaren Rahmen würde eine Ontologie zu komplex und</a:t>
-            </a:r>
-          </a:p>
-          <a:p>
-            <a:r>
-              <a:rPr lang="de-CH" sz="1200" b="0" i="0" u="none" strike="noStrike" kern="1200" baseline="0" dirty="0" smtClean="0">
-                <a:solidFill>
-                  <a:schemeClr val="tx1"/>
-                </a:solidFill>
-                <a:latin typeface="+mn-lt"/>
-                <a:ea typeface="+mn-ea"/>
-                <a:cs typeface="+mn-cs"/>
-              </a:rPr>
-              <a:t>zu gross. Daher bauten die Autoren die Ontologie anhand exemplarischer Tages und </a:t>
-            </a:r>
-            <a:r>
-              <a:rPr lang="de-CH" sz="1200" b="0" i="0" u="none" strike="noStrike" kern="1200" baseline="0" dirty="0" err="1" smtClean="0">
-                <a:solidFill>
-                  <a:schemeClr val="tx1"/>
-                </a:solidFill>
-                <a:latin typeface="+mn-lt"/>
-                <a:ea typeface="+mn-ea"/>
-                <a:cs typeface="+mn-cs"/>
-              </a:rPr>
-              <a:t>Wochenendausügen</a:t>
-            </a:r>
-            <a:r>
-              <a:rPr lang="de-CH" sz="1200" b="0" i="0" u="none" strike="noStrike" kern="1200" baseline="0" dirty="0" smtClean="0">
-                <a:solidFill>
-                  <a:schemeClr val="tx1"/>
-                </a:solidFill>
-                <a:latin typeface="+mn-lt"/>
-                <a:ea typeface="+mn-ea"/>
-                <a:cs typeface="+mn-cs"/>
-              </a:rPr>
-              <a:t> in der</a:t>
-            </a:r>
-          </a:p>
-          <a:p>
-            <a:r>
-              <a:rPr lang="de-CH" sz="1200" b="0" i="0" u="none" strike="noStrike" kern="1200" baseline="0" dirty="0" smtClean="0">
-                <a:solidFill>
-                  <a:schemeClr val="tx1"/>
-                </a:solidFill>
-                <a:latin typeface="+mn-lt"/>
-                <a:ea typeface="+mn-ea"/>
-                <a:cs typeface="+mn-cs"/>
-              </a:rPr>
-              <a:t>Schweiz auf.</a:t>
-            </a:r>
-          </a:p>
-          <a:p>
-            <a:endParaRPr lang="de-CH" sz="1200" b="0" i="0" u="none" strike="noStrike" kern="1200" baseline="0" dirty="0" smtClean="0">
-              <a:solidFill>
-                <a:schemeClr val="tx1"/>
-              </a:solidFill>
-              <a:latin typeface="+mn-lt"/>
-              <a:ea typeface="+mn-ea"/>
-              <a:cs typeface="+mn-cs"/>
-            </a:endParaRPr>
-          </a:p>
-          <a:p>
-            <a:r>
-              <a:rPr lang="de-CH" sz="1200" b="0" i="0" u="none" strike="noStrike" kern="1200" baseline="0" dirty="0" smtClean="0">
-                <a:solidFill>
-                  <a:schemeClr val="tx1"/>
-                </a:solidFill>
-                <a:latin typeface="+mn-lt"/>
-                <a:ea typeface="+mn-ea"/>
-                <a:cs typeface="+mn-cs"/>
-              </a:rPr>
-              <a:t>-&gt; Fokus beim Aufbau der Ontologie: Prozess; Mächtigkeit erforschen und ausnützen</a:t>
-            </a:r>
-          </a:p>
-          <a:p>
+              <a:t>aufgebaut und per Benutzerschnittstelle zugänglich gemacht werden.</a:t>
+            </a:r>
             <a:endParaRPr lang="de-CH" dirty="0"/>
           </a:p>
         </p:txBody>
@@ -1423,7 +1152,7 @@
           <a:p>
             <a:fld id="{87AD8812-5900-498C-95A0-946A82B6DFB7}" type="slidenum">
               <a:rPr lang="de-CH" smtClean="0"/>
-              <a:t>7</a:t>
+              <a:t>5</a:t>
             </a:fld>
             <a:endParaRPr lang="de-CH"/>
           </a:p>
@@ -1432,7 +1161,7 @@
     </p:spTree>
     <p:extLst>
       <p:ext uri="{BB962C8B-B14F-4D97-AF65-F5344CB8AC3E}">
-        <p14:creationId xmlns:p14="http://schemas.microsoft.com/office/powerpoint/2010/main" val="450920744"/>
+        <p14:creationId xmlns:p14="http://schemas.microsoft.com/office/powerpoint/2010/main" val="4245693295"/>
       </p:ext>
     </p:extLst>
   </p:cSld>
@@ -1488,6 +1217,361 @@
           <a:p>
             <a:r>
               <a:rPr lang="de-CH" dirty="0" smtClean="0"/>
+              <a:t>Problemdomäne ursprünglich Prolog</a:t>
+            </a:r>
+          </a:p>
+          <a:p>
+            <a:r>
+              <a:rPr lang="de-CH" dirty="0" smtClean="0"/>
+              <a:t>-&gt;</a:t>
+            </a:r>
+            <a:r>
+              <a:rPr lang="de-CH" baseline="0" dirty="0" smtClean="0"/>
+              <a:t> Für welche Art von Domänen sind </a:t>
+            </a:r>
+            <a:r>
+              <a:rPr lang="de-CH" baseline="0" dirty="0" err="1" smtClean="0"/>
+              <a:t>Ontologien</a:t>
+            </a:r>
+            <a:r>
+              <a:rPr lang="de-CH" baseline="0" dirty="0" smtClean="0"/>
+              <a:t> geeignet</a:t>
+            </a:r>
+            <a:endParaRPr lang="de-CH" dirty="0" smtClean="0"/>
+          </a:p>
+          <a:p>
+            <a:endParaRPr lang="de-CH" dirty="0" smtClean="0"/>
+          </a:p>
+          <a:p>
+            <a:endParaRPr lang="de-CH" dirty="0" smtClean="0"/>
+          </a:p>
+          <a:p>
+            <a:r>
+              <a:rPr lang="de-CH" sz="1200" b="0" i="0" u="none" strike="noStrike" kern="1200" baseline="0" dirty="0" smtClean="0">
+                <a:solidFill>
+                  <a:schemeClr val="tx1"/>
+                </a:solidFill>
+                <a:latin typeface="+mn-lt"/>
+                <a:ea typeface="+mn-ea"/>
+                <a:cs typeface="+mn-cs"/>
+              </a:rPr>
+              <a:t>Im praktischen Teil der Arbeit wurde ein Expertensystem für Reisen aufgebaut: In der heutigen Zeit werden Ferien</a:t>
+            </a:r>
+          </a:p>
+          <a:p>
+            <a:r>
+              <a:rPr lang="de-CH" sz="1200" b="0" i="0" u="none" strike="noStrike" kern="1200" baseline="0" dirty="0" err="1" smtClean="0">
+                <a:solidFill>
+                  <a:schemeClr val="tx1"/>
+                </a:solidFill>
+                <a:latin typeface="+mn-lt"/>
+                <a:ea typeface="+mn-ea"/>
+                <a:cs typeface="+mn-cs"/>
+              </a:rPr>
+              <a:t>häug</a:t>
+            </a:r>
+            <a:r>
+              <a:rPr lang="de-CH" sz="1200" b="0" i="0" u="none" strike="noStrike" kern="1200" baseline="0" dirty="0" smtClean="0">
+                <a:solidFill>
+                  <a:schemeClr val="tx1"/>
+                </a:solidFill>
+                <a:latin typeface="+mn-lt"/>
+                <a:ea typeface="+mn-ea"/>
+                <a:cs typeface="+mn-cs"/>
+              </a:rPr>
+              <a:t> per Internet gebucht. Was aber, wenn der Urlaub nicht einfach zwei Wochen an einem Ort </a:t>
+            </a:r>
+            <a:r>
+              <a:rPr lang="de-CH" sz="1200" b="0" i="0" u="none" strike="noStrike" kern="1200" baseline="0" dirty="0" err="1" smtClean="0">
+                <a:solidFill>
+                  <a:schemeClr val="tx1"/>
+                </a:solidFill>
+                <a:latin typeface="+mn-lt"/>
+                <a:ea typeface="+mn-ea"/>
+                <a:cs typeface="+mn-cs"/>
+              </a:rPr>
+              <a:t>stattnden</a:t>
+            </a:r>
+            <a:endParaRPr lang="de-CH" sz="1200" b="0" i="0" u="none" strike="noStrike" kern="1200" baseline="0" dirty="0" smtClean="0">
+              <a:solidFill>
+                <a:schemeClr val="tx1"/>
+              </a:solidFill>
+              <a:latin typeface="+mn-lt"/>
+              <a:ea typeface="+mn-ea"/>
+              <a:cs typeface="+mn-cs"/>
+            </a:endParaRPr>
+          </a:p>
+          <a:p>
+            <a:r>
+              <a:rPr lang="de-CH" sz="1200" b="0" i="0" u="none" strike="noStrike" kern="1200" baseline="0" dirty="0" smtClean="0">
+                <a:solidFill>
+                  <a:schemeClr val="tx1"/>
+                </a:solidFill>
+                <a:latin typeface="+mn-lt"/>
+                <a:ea typeface="+mn-ea"/>
+                <a:cs typeface="+mn-cs"/>
+              </a:rPr>
+              <a:t>soll? Was, wenn der Kunde reisen möchte? Oder sonstige spezielle Wünsche hat? Für solche Anforderungen muss</a:t>
+            </a:r>
+          </a:p>
+          <a:p>
+            <a:r>
+              <a:rPr lang="de-CH" sz="1200" b="0" i="0" u="none" strike="noStrike" kern="1200" baseline="0" dirty="0" smtClean="0">
+                <a:solidFill>
+                  <a:schemeClr val="tx1"/>
+                </a:solidFill>
+                <a:latin typeface="+mn-lt"/>
+                <a:ea typeface="+mn-ea"/>
+                <a:cs typeface="+mn-cs"/>
+              </a:rPr>
+              <a:t>er auch heute noch in ein Reisebüro um sich beraten zu lassen.</a:t>
+            </a:r>
+          </a:p>
+          <a:p>
+            <a:r>
+              <a:rPr lang="de-CH" sz="1200" b="0" i="0" u="none" strike="noStrike" kern="1200" baseline="0" dirty="0" smtClean="0">
+                <a:solidFill>
+                  <a:schemeClr val="tx1"/>
+                </a:solidFill>
+                <a:latin typeface="+mn-lt"/>
+                <a:ea typeface="+mn-ea"/>
+                <a:cs typeface="+mn-cs"/>
+              </a:rPr>
+              <a:t>Bei der Automatisierung dieses Prozesses kommt die Ontologie ins Spiel, welche mithilfe von Eigenschaften,</a:t>
+            </a:r>
+          </a:p>
+          <a:p>
+            <a:r>
+              <a:rPr lang="de-CH" sz="1200" b="0" i="0" u="none" strike="noStrike" kern="1200" baseline="0" dirty="0" smtClean="0">
+                <a:solidFill>
+                  <a:schemeClr val="tx1"/>
+                </a:solidFill>
+                <a:latin typeface="+mn-lt"/>
+                <a:ea typeface="+mn-ea"/>
+                <a:cs typeface="+mn-cs"/>
+              </a:rPr>
+              <a:t>Kriterien und Regeln die Problemdomäne abbildet. Durch die Verwendung eines </a:t>
+            </a:r>
+            <a:r>
+              <a:rPr lang="de-CH" sz="1200" b="0" i="0" u="none" strike="noStrike" kern="1200" baseline="0" dirty="0" err="1" smtClean="0">
+                <a:solidFill>
+                  <a:schemeClr val="tx1"/>
+                </a:solidFill>
+                <a:latin typeface="+mn-lt"/>
+                <a:ea typeface="+mn-ea"/>
+                <a:cs typeface="+mn-cs"/>
+              </a:rPr>
+              <a:t>Reasoners</a:t>
+            </a:r>
+            <a:r>
+              <a:rPr lang="de-CH" sz="1200" b="0" i="0" u="none" strike="noStrike" kern="1200" baseline="0" dirty="0" smtClean="0">
+                <a:solidFill>
+                  <a:schemeClr val="tx1"/>
+                </a:solidFill>
+                <a:latin typeface="+mn-lt"/>
+                <a:ea typeface="+mn-ea"/>
+                <a:cs typeface="+mn-cs"/>
+              </a:rPr>
+              <a:t> können verschiedene</a:t>
+            </a:r>
+          </a:p>
+          <a:p>
+            <a:r>
+              <a:rPr lang="de-CH" sz="1200" b="0" i="0" u="none" strike="noStrike" kern="1200" baseline="0" dirty="0" smtClean="0">
+                <a:solidFill>
+                  <a:schemeClr val="tx1"/>
+                </a:solidFill>
+                <a:latin typeface="+mn-lt"/>
+                <a:ea typeface="+mn-ea"/>
+                <a:cs typeface="+mn-cs"/>
+              </a:rPr>
+              <a:t>Reisevorschläge gemacht werden.</a:t>
+            </a:r>
+          </a:p>
+          <a:p>
+            <a:r>
+              <a:rPr lang="de-CH" sz="1200" b="0" i="0" u="none" strike="noStrike" kern="1200" baseline="0" dirty="0" smtClean="0">
+                <a:solidFill>
+                  <a:schemeClr val="tx1"/>
+                </a:solidFill>
+                <a:latin typeface="+mn-lt"/>
+                <a:ea typeface="+mn-ea"/>
+                <a:cs typeface="+mn-cs"/>
+              </a:rPr>
+              <a:t>Um eine sehr individuelle Reiseplanung zu erreichen, musste zuerst eine Ontologie in Form von Klassen, Individuen,</a:t>
+            </a:r>
+          </a:p>
+          <a:p>
+            <a:r>
+              <a:rPr lang="de-CH" sz="1200" b="0" i="0" u="none" strike="noStrike" kern="1200" baseline="0" dirty="0" smtClean="0">
+                <a:solidFill>
+                  <a:schemeClr val="tx1"/>
+                </a:solidFill>
+                <a:latin typeface="+mn-lt"/>
+                <a:ea typeface="+mn-ea"/>
+                <a:cs typeface="+mn-cs"/>
+              </a:rPr>
+              <a:t>Relationen und Eigenschaften erstellt werden. Ohne klaren Rahmen würde eine Ontologie zu komplex und</a:t>
+            </a:r>
+          </a:p>
+          <a:p>
+            <a:r>
+              <a:rPr lang="de-CH" sz="1200" b="0" i="0" u="none" strike="noStrike" kern="1200" baseline="0" dirty="0" smtClean="0">
+                <a:solidFill>
+                  <a:schemeClr val="tx1"/>
+                </a:solidFill>
+                <a:latin typeface="+mn-lt"/>
+                <a:ea typeface="+mn-ea"/>
+                <a:cs typeface="+mn-cs"/>
+              </a:rPr>
+              <a:t>zu gross. Daher bauten die Autoren die Ontologie anhand exemplarischer Tages und </a:t>
+            </a:r>
+            <a:r>
+              <a:rPr lang="de-CH" sz="1200" b="0" i="0" u="none" strike="noStrike" kern="1200" baseline="0" dirty="0" err="1" smtClean="0">
+                <a:solidFill>
+                  <a:schemeClr val="tx1"/>
+                </a:solidFill>
+                <a:latin typeface="+mn-lt"/>
+                <a:ea typeface="+mn-ea"/>
+                <a:cs typeface="+mn-cs"/>
+              </a:rPr>
+              <a:t>Wochenendausügen</a:t>
+            </a:r>
+            <a:r>
+              <a:rPr lang="de-CH" sz="1200" b="0" i="0" u="none" strike="noStrike" kern="1200" baseline="0" dirty="0" smtClean="0">
+                <a:solidFill>
+                  <a:schemeClr val="tx1"/>
+                </a:solidFill>
+                <a:latin typeface="+mn-lt"/>
+                <a:ea typeface="+mn-ea"/>
+                <a:cs typeface="+mn-cs"/>
+              </a:rPr>
+              <a:t> in der</a:t>
+            </a:r>
+          </a:p>
+          <a:p>
+            <a:r>
+              <a:rPr lang="de-CH" sz="1200" b="0" i="0" u="none" strike="noStrike" kern="1200" baseline="0" dirty="0" smtClean="0">
+                <a:solidFill>
+                  <a:schemeClr val="tx1"/>
+                </a:solidFill>
+                <a:latin typeface="+mn-lt"/>
+                <a:ea typeface="+mn-ea"/>
+                <a:cs typeface="+mn-cs"/>
+              </a:rPr>
+              <a:t>Schweiz auf.</a:t>
+            </a:r>
+          </a:p>
+          <a:p>
+            <a:endParaRPr lang="de-CH" sz="1200" b="0" i="0" u="none" strike="noStrike" kern="1200" baseline="0" dirty="0" smtClean="0">
+              <a:solidFill>
+                <a:schemeClr val="tx1"/>
+              </a:solidFill>
+              <a:latin typeface="+mn-lt"/>
+              <a:ea typeface="+mn-ea"/>
+              <a:cs typeface="+mn-cs"/>
+            </a:endParaRPr>
+          </a:p>
+          <a:p>
+            <a:r>
+              <a:rPr lang="de-CH" sz="1200" b="0" i="0" u="none" strike="noStrike" kern="1200" baseline="0" dirty="0" smtClean="0">
+                <a:solidFill>
+                  <a:schemeClr val="tx1"/>
+                </a:solidFill>
+                <a:latin typeface="+mn-lt"/>
+                <a:ea typeface="+mn-ea"/>
+                <a:cs typeface="+mn-cs"/>
+              </a:rPr>
+              <a:t>-&gt; Fokus beim Aufbau der Ontologie: Prozess; Mächtigkeit erforschen und ausnützen</a:t>
+            </a:r>
+          </a:p>
+          <a:p>
+            <a:endParaRPr lang="de-CH" dirty="0"/>
+          </a:p>
+        </p:txBody>
+      </p:sp>
+      <p:sp>
+        <p:nvSpPr>
+          <p:cNvPr id="4" name="Foliennummernplatzhalter 3"/>
+          <p:cNvSpPr>
+            <a:spLocks noGrp="1"/>
+          </p:cNvSpPr>
+          <p:nvPr>
+            <p:ph type="sldNum" sz="quarter" idx="10"/>
+          </p:nvPr>
+        </p:nvSpPr>
+        <p:spPr/>
+        <p:txBody>
+          <a:bodyPr/>
+          <a:lstStyle/>
+          <a:p>
+            <a:fld id="{87AD8812-5900-498C-95A0-946A82B6DFB7}" type="slidenum">
+              <a:rPr lang="de-CH" smtClean="0"/>
+              <a:t>7</a:t>
+            </a:fld>
+            <a:endParaRPr lang="de-CH"/>
+          </a:p>
+        </p:txBody>
+      </p:sp>
+    </p:spTree>
+    <p:extLst>
+      <p:ext uri="{BB962C8B-B14F-4D97-AF65-F5344CB8AC3E}">
+        <p14:creationId xmlns:p14="http://schemas.microsoft.com/office/powerpoint/2010/main" val="450920744"/>
+      </p:ext>
+    </p:extLst>
+  </p:cSld>
+  <p:clrMapOvr>
+    <a:masterClrMapping/>
+  </p:clrMapOvr>
+</p:notes>
+</file>
+
+<file path=ppt/notesSlides/notesSlide6.xml><?xml version="1.0" encoding="utf-8"?>
+<p:notes xmlns:a="http://schemas.openxmlformats.org/drawingml/2006/main" xmlns:r="http://schemas.openxmlformats.org/officeDocument/2006/relationships" xmlns:p="http://schemas.openxmlformats.org/presentationml/2006/main">
+  <p:cSld>
+    <p:spTree>
+      <p:nvGrpSpPr>
+        <p:cNvPr id="1" name=""/>
+        <p:cNvGrpSpPr/>
+        <p:nvPr/>
+      </p:nvGrpSpPr>
+      <p:grpSpPr>
+        <a:xfrm>
+          <a:off x="0" y="0"/>
+          <a:ext cx="0" cy="0"/>
+          <a:chOff x="0" y="0"/>
+          <a:chExt cx="0" cy="0"/>
+        </a:xfrm>
+      </p:grpSpPr>
+      <p:sp>
+        <p:nvSpPr>
+          <p:cNvPr id="2" name="Folienbildplatzhalter 1"/>
+          <p:cNvSpPr>
+            <a:spLocks noGrp="1" noRot="1" noChangeAspect="1"/>
+          </p:cNvSpPr>
+          <p:nvPr>
+            <p:ph type="sldImg"/>
+          </p:nvPr>
+        </p:nvSpPr>
+        <p:spPr/>
+      </p:sp>
+      <p:sp>
+        <p:nvSpPr>
+          <p:cNvPr id="3" name="Notizenplatzhalter 2"/>
+          <p:cNvSpPr>
+            <a:spLocks noGrp="1"/>
+          </p:cNvSpPr>
+          <p:nvPr>
+            <p:ph type="body" idx="1"/>
+          </p:nvPr>
+        </p:nvSpPr>
+        <p:spPr/>
+        <p:txBody>
+          <a:bodyPr/>
+          <a:lstStyle/>
+          <a:p>
+            <a:r>
+              <a:rPr lang="de-CH" dirty="0" smtClean="0"/>
               <a:t>Beschränkt </a:t>
             </a:r>
             <a:r>
@@ -1515,11 +1599,7 @@
           <a:p>
             <a:r>
               <a:rPr lang="de-CH" dirty="0" smtClean="0"/>
-              <a:t>Werkzeuge</a:t>
-            </a:r>
-            <a:r>
-              <a:rPr lang="de-CH" dirty="0" smtClean="0"/>
-              <a:t>:</a:t>
+              <a:t>Werkzeuge:</a:t>
             </a:r>
             <a:r>
               <a:rPr lang="de-CH" baseline="0" dirty="0" smtClean="0"/>
@@ -1815,7 +1895,7 @@
           <a:p>
             <a:fld id="{DCF8FE8D-FD10-47B6-8072-05EB8C741936}" type="datetimeFigureOut">
               <a:rPr lang="de-CH" smtClean="0"/>
-              <a:t>19.12.2014</a:t>
+              <a:t>30.12.2014</a:t>
             </a:fld>
             <a:endParaRPr lang="de-CH"/>
           </a:p>
@@ -2023,7 +2103,7 @@
           <a:p>
             <a:fld id="{DCF8FE8D-FD10-47B6-8072-05EB8C741936}" type="datetimeFigureOut">
               <a:rPr lang="de-CH" smtClean="0"/>
-              <a:t>19.12.2014</a:t>
+              <a:t>30.12.2014</a:t>
             </a:fld>
             <a:endParaRPr lang="de-CH"/>
           </a:p>
@@ -2279,7 +2359,7 @@
           <a:p>
             <a:fld id="{DCF8FE8D-FD10-47B6-8072-05EB8C741936}" type="datetimeFigureOut">
               <a:rPr lang="de-CH" smtClean="0"/>
-              <a:t>19.12.2014</a:t>
+              <a:t>30.12.2014</a:t>
             </a:fld>
             <a:endParaRPr lang="de-CH"/>
           </a:p>
@@ -2470,7 +2550,7 @@
           <a:p>
             <a:fld id="{DCF8FE8D-FD10-47B6-8072-05EB8C741936}" type="datetimeFigureOut">
               <a:rPr lang="de-CH" smtClean="0"/>
-              <a:t>19.12.2014</a:t>
+              <a:t>30.12.2014</a:t>
             </a:fld>
             <a:endParaRPr lang="de-CH"/>
           </a:p>
@@ -2813,7 +2893,7 @@
           <a:p>
             <a:fld id="{DCF8FE8D-FD10-47B6-8072-05EB8C741936}" type="datetimeFigureOut">
               <a:rPr lang="de-CH" smtClean="0"/>
-              <a:t>19.12.2014</a:t>
+              <a:t>30.12.2014</a:t>
             </a:fld>
             <a:endParaRPr lang="de-CH"/>
           </a:p>
@@ -3088,7 +3168,7 @@
           <a:p>
             <a:fld id="{DCF8FE8D-FD10-47B6-8072-05EB8C741936}" type="datetimeFigureOut">
               <a:rPr lang="de-CH" smtClean="0"/>
-              <a:t>19.12.2014</a:t>
+              <a:t>30.12.2014</a:t>
             </a:fld>
             <a:endParaRPr lang="de-CH"/>
           </a:p>
@@ -3467,7 +3547,7 @@
           <a:p>
             <a:fld id="{DCF8FE8D-FD10-47B6-8072-05EB8C741936}" type="datetimeFigureOut">
               <a:rPr lang="de-CH" smtClean="0"/>
-              <a:t>19.12.2014</a:t>
+              <a:t>30.12.2014</a:t>
             </a:fld>
             <a:endParaRPr lang="de-CH"/>
           </a:p>
@@ -3585,7 +3665,7 @@
           <a:p>
             <a:fld id="{DCF8FE8D-FD10-47B6-8072-05EB8C741936}" type="datetimeFigureOut">
               <a:rPr lang="de-CH" smtClean="0"/>
-              <a:t>19.12.2014</a:t>
+              <a:t>30.12.2014</a:t>
             </a:fld>
             <a:endParaRPr lang="de-CH"/>
           </a:p>
@@ -3756,7 +3836,7 @@
           <a:p>
             <a:fld id="{DCF8FE8D-FD10-47B6-8072-05EB8C741936}" type="datetimeFigureOut">
               <a:rPr lang="de-CH" smtClean="0"/>
-              <a:t>19.12.2014</a:t>
+              <a:t>30.12.2014</a:t>
             </a:fld>
             <a:endParaRPr lang="de-CH"/>
           </a:p>
@@ -4110,7 +4190,7 @@
           <a:p>
             <a:fld id="{DCF8FE8D-FD10-47B6-8072-05EB8C741936}" type="datetimeFigureOut">
               <a:rPr lang="de-CH" smtClean="0"/>
-              <a:t>19.12.2014</a:t>
+              <a:t>30.12.2014</a:t>
             </a:fld>
             <a:endParaRPr lang="de-CH"/>
           </a:p>
@@ -4487,7 +4567,7 @@
           <a:p>
             <a:fld id="{DCF8FE8D-FD10-47B6-8072-05EB8C741936}" type="datetimeFigureOut">
               <a:rPr lang="de-CH" smtClean="0"/>
-              <a:t>19.12.2014</a:t>
+              <a:t>30.12.2014</a:t>
             </a:fld>
             <a:endParaRPr lang="de-CH"/>
           </a:p>
@@ -4774,7 +4854,7 @@
           <a:p>
             <a:fld id="{DCF8FE8D-FD10-47B6-8072-05EB8C741936}" type="datetimeFigureOut">
               <a:rPr lang="de-CH" smtClean="0"/>
-              <a:t>19.12.2014</a:t>
+              <a:t>30.12.2014</a:t>
             </a:fld>
             <a:endParaRPr lang="de-CH"/>
           </a:p>
@@ -5345,7 +5425,9 @@
           </a:xfrm>
         </p:spPr>
         <p:txBody>
-          <a:bodyPr/>
+          <a:bodyPr>
+            <a:normAutofit lnSpcReduction="10000"/>
+          </a:bodyPr>
           <a:lstStyle/>
           <a:p>
             <a:r>
@@ -5373,7 +5455,36 @@
             </a:r>
             <a:r>
               <a:rPr lang="de-CH" dirty="0" smtClean="0"/>
-              <a:t> Osterwalder</a:t>
+              <a:t> </a:t>
+            </a:r>
+            <a:r>
+              <a:rPr lang="de-CH" dirty="0" smtClean="0"/>
+              <a:t>Osterwalder</a:t>
+            </a:r>
+          </a:p>
+          <a:p>
+            <a:r>
+              <a:rPr lang="de-CH" dirty="0" smtClean="0"/>
+              <a:t>Betreuer: 	Dr. Jürgen </a:t>
+            </a:r>
+            <a:r>
+              <a:rPr lang="de-CH" dirty="0" err="1" smtClean="0"/>
+              <a:t>Eckerle</a:t>
+            </a:r>
+            <a:endParaRPr lang="de-CH" dirty="0" smtClean="0"/>
+          </a:p>
+          <a:p>
+            <a:r>
+              <a:rPr lang="de-CH" dirty="0" smtClean="0"/>
+              <a:t>Experte:	</a:t>
+            </a:r>
+            <a:r>
+              <a:rPr lang="de-CH" dirty="0" err="1" smtClean="0"/>
+              <a:t>Jean-marie</a:t>
+            </a:r>
+            <a:r>
+              <a:rPr lang="de-CH" dirty="0" smtClean="0"/>
+              <a:t> Leclerc</a:t>
             </a:r>
             <a:endParaRPr lang="de-CH" dirty="0"/>
           </a:p>
@@ -5406,6 +5517,34 @@
               <a:t>Abschlusspräsentation Bachelor Thesis</a:t>
             </a:r>
             <a:endParaRPr lang="de-CH" sz="4000" dirty="0"/>
+          </a:p>
+        </p:txBody>
+      </p:sp>
+      <p:sp>
+        <p:nvSpPr>
+          <p:cNvPr id="5" name="Datumsplatzhalter 4"/>
+          <p:cNvSpPr>
+            <a:spLocks noGrp="1"/>
+          </p:cNvSpPr>
+          <p:nvPr>
+            <p:ph type="dt" sz="half" idx="10"/>
+          </p:nvPr>
+        </p:nvSpPr>
+        <p:spPr>
+          <a:xfrm>
+            <a:off x="1097280" y="6459785"/>
+            <a:ext cx="4164676" cy="365125"/>
+          </a:xfrm>
+        </p:spPr>
+        <p:txBody>
+          <a:bodyPr/>
+          <a:lstStyle/>
+          <a:p>
+            <a:r>
+              <a:rPr lang="de-CH" dirty="0" smtClean="0"/>
+              <a:t>Berner Fachhochschule für Technik und Informatik	</a:t>
+            </a:r>
+            <a:endParaRPr lang="de-CH" dirty="0"/>
           </a:p>
         </p:txBody>
       </p:sp>
@@ -5469,25 +5608,32 @@
           </a:p>
         </p:txBody>
       </p:sp>
-      <p:sp>
-        <p:nvSpPr>
-          <p:cNvPr id="3" name="Inhaltsplatzhalter 2"/>
-          <p:cNvSpPr>
-            <a:spLocks noGrp="1"/>
-          </p:cNvSpPr>
+      <p:pic>
+        <p:nvPicPr>
+          <p:cNvPr id="4" name="Inhaltsplatzhalter 3"/>
+          <p:cNvPicPr>
+            <a:picLocks noGrp="1" noChangeAspect="1"/>
+          </p:cNvPicPr>
           <p:nvPr>
             <p:ph idx="1"/>
           </p:nvPr>
-        </p:nvSpPr>
-        <p:spPr/>
-        <p:txBody>
-          <a:bodyPr/>
-          <a:lstStyle/>
-          <a:p>
-            <a:endParaRPr lang="de-CH"/>
-          </a:p>
-        </p:txBody>
-      </p:sp>
+        </p:nvPicPr>
+        <p:blipFill>
+          <a:blip r:embed="rId2"/>
+          <a:stretch>
+            <a:fillRect/>
+          </a:stretch>
+        </p:blipFill>
+        <p:spPr>
+          <a:xfrm>
+            <a:off x="2363402" y="1813013"/>
+            <a:ext cx="6644372" cy="4022725"/>
+          </a:xfrm>
+          <a:prstGeom prst="rect">
+            <a:avLst/>
+          </a:prstGeom>
+        </p:spPr>
+      </p:pic>
     </p:spTree>
     <p:extLst>
       <p:ext uri="{BB962C8B-B14F-4D97-AF65-F5344CB8AC3E}">
@@ -5620,7 +5766,7 @@
           <a:lstStyle/>
           <a:p>
             <a:r>
-              <a:rPr lang="de-CH" smtClean="0"/>
+              <a:rPr lang="de-CH" dirty="0" smtClean="0"/>
               <a:t>Fazit</a:t>
             </a:r>
             <a:endParaRPr lang="de-CH" dirty="0"/>
@@ -5671,7 +5817,6 @@
               <a:rPr lang="de-CH" dirty="0" smtClean="0"/>
               <a:t>Beschränkt intelligent</a:t>
             </a:r>
-            <a:endParaRPr lang="de-CH" dirty="0" smtClean="0"/>
           </a:p>
           <a:p>
             <a:pPr lvl="1"/>
@@ -5679,7 +5824,6 @@
               <a:rPr lang="de-CH" dirty="0" smtClean="0"/>
               <a:t>Werkzeuge</a:t>
             </a:r>
-            <a:endParaRPr lang="de-CH" dirty="0" smtClean="0"/>
           </a:p>
         </p:txBody>
       </p:sp>
@@ -5736,7 +5880,7 @@
           <a:lstStyle/>
           <a:p>
             <a:r>
-              <a:rPr lang="de-CH" smtClean="0"/>
+              <a:rPr lang="de-CH" dirty="0" smtClean="0"/>
               <a:t>Ablauf</a:t>
             </a:r>
             <a:endParaRPr lang="de-CH" dirty="0"/>
@@ -5861,7 +6005,7 @@
           <a:lstStyle/>
           <a:p>
             <a:r>
-              <a:rPr lang="de-CH" smtClean="0"/>
+              <a:rPr lang="de-CH" dirty="0" smtClean="0"/>
               <a:t>Motivation</a:t>
             </a:r>
             <a:endParaRPr lang="de-CH" dirty="0"/>
@@ -5969,7 +6113,7 @@
           <a:lstStyle/>
           <a:p>
             <a:r>
-              <a:rPr lang="de-CH" smtClean="0"/>
+              <a:rPr lang="de-CH" dirty="0" smtClean="0"/>
               <a:t>Wissensabbildung</a:t>
             </a:r>
             <a:endParaRPr lang="de-CH" dirty="0"/>
@@ -5992,7 +6136,7 @@
           <a:lstStyle/>
           <a:p>
             <a:r>
-              <a:rPr lang="de-CH" smtClean="0">
+              <a:rPr lang="de-CH" dirty="0" smtClean="0">
                 <a:sym typeface="Wingdings" panose="05000000000000000000" pitchFamily="2" charset="2"/>
               </a:rPr>
               <a:t>Relationale Datenspeicherung</a:t>
@@ -6000,7 +6144,7 @@
           </a:p>
           <a:p>
             <a:r>
-              <a:rPr lang="de-CH" smtClean="0">
+              <a:rPr lang="de-CH" dirty="0" smtClean="0">
                 <a:sym typeface="Wingdings" panose="05000000000000000000" pitchFamily="2" charset="2"/>
               </a:rPr>
               <a:t>Semantische Datenbanken</a:t>
@@ -6009,11 +6153,20 @@
           <a:p>
             <a:pPr lvl="3"/>
             <a:r>
-              <a:rPr lang="de-CH" smtClean="0">
+              <a:rPr lang="de-CH" dirty="0" smtClean="0">
                 <a:sym typeface="Wingdings" panose="05000000000000000000" pitchFamily="2" charset="2"/>
               </a:rPr>
-              <a:t>Wissensmodellierung auf Basis von Ontologien</a:t>
-            </a:r>
+              <a:t>Wissensmodellierung auf Basis von </a:t>
+            </a:r>
+            <a:r>
+              <a:rPr lang="de-CH" dirty="0" err="1" smtClean="0">
+                <a:sym typeface="Wingdings" panose="05000000000000000000" pitchFamily="2" charset="2"/>
+              </a:rPr>
+              <a:t>Ontologien</a:t>
+            </a:r>
+            <a:endParaRPr lang="de-CH" dirty="0" smtClean="0">
+              <a:sym typeface="Wingdings" panose="05000000000000000000" pitchFamily="2" charset="2"/>
+            </a:endParaRPr>
           </a:p>
           <a:p>
             <a:endParaRPr lang="de-CH" dirty="0"/>
@@ -6131,8 +6284,8 @@
           <a:p>
             <a:pPr lvl="2"/>
             <a:r>
-              <a:rPr lang="de-CH" dirty="0" err="1" smtClean="0"/>
-              <a:t>Benutzerschnitstelle</a:t>
+              <a:rPr lang="de-CH" dirty="0" smtClean="0"/>
+              <a:t>Benutzerschnittstelle</a:t>
             </a:r>
             <a:endParaRPr lang="de-CH" dirty="0"/>
           </a:p>
@@ -6191,7 +6344,7 @@
           <a:lstStyle/>
           <a:p>
             <a:r>
-              <a:rPr lang="de-CH" smtClean="0"/>
+              <a:rPr lang="de-CH" dirty="0" smtClean="0"/>
               <a:t>Tutorial</a:t>
             </a:r>
             <a:endParaRPr lang="de-CH" dirty="0"/>
@@ -6319,7 +6472,7 @@
           <a:lstStyle/>
           <a:p>
             <a:r>
-              <a:rPr lang="de-CH" smtClean="0"/>
+              <a:rPr lang="de-CH" dirty="0" smtClean="0"/>
               <a:t>Aufbau Ontologie</a:t>
             </a:r>
             <a:endParaRPr lang="de-CH" dirty="0"/>
@@ -6369,12 +6522,25 @@
             </a:r>
             <a:r>
               <a:rPr lang="de-CH" dirty="0" err="1" smtClean="0"/>
-              <a:t>Protege</a:t>
+              <a:t>Stanbol</a:t>
             </a:r>
             <a:r>
               <a:rPr lang="de-CH" dirty="0" smtClean="0"/>
-              <a:t>/ …</a:t>
-            </a:r>
+              <a:t>/ </a:t>
+            </a:r>
+            <a:r>
+              <a:rPr lang="de-CH" dirty="0" err="1" smtClean="0"/>
+              <a:t>Protégé</a:t>
+            </a:r>
+            <a:r>
+              <a:rPr lang="de-CH" dirty="0" smtClean="0"/>
+              <a:t>/ </a:t>
+            </a:r>
+            <a:r>
+              <a:rPr lang="de-CH" dirty="0" err="1" smtClean="0"/>
+              <a:t>Stardog</a:t>
+            </a:r>
+            <a:endParaRPr lang="de-CH" dirty="0" smtClean="0"/>
           </a:p>
           <a:p>
             <a:r>
@@ -6584,7 +6750,7 @@
           <a:lstStyle/>
           <a:p>
             <a:r>
-              <a:rPr lang="de-CH" smtClean="0"/>
+              <a:rPr lang="de-CH" dirty="0" smtClean="0"/>
               <a:t>Benutzerschnittstelle</a:t>
             </a:r>
             <a:endParaRPr lang="de-CH" dirty="0"/>
@@ -6665,7 +6831,6 @@
               <a:rPr lang="de-CH" dirty="0" smtClean="0"/>
               <a:t>Schritt-für-Schritt Assistent</a:t>
             </a:r>
-            <a:endParaRPr lang="de-CH" dirty="0" smtClean="0"/>
           </a:p>
         </p:txBody>
       </p:sp>

</xml_diff>